<commit_message>
11/25, 9:23, revise proposal PPT
</commit_message>
<xml_diff>
--- a/AD_project_proposal_PT.pptx
+++ b/AD_project_proposal_PT.pptx
@@ -22,9 +22,9 @@
     <p:sldId id="283" r:id="rId16"/>
     <p:sldId id="271" r:id="rId17"/>
     <p:sldId id="272" r:id="rId18"/>
-    <p:sldId id="275" r:id="rId19"/>
-    <p:sldId id="273" r:id="rId20"/>
-    <p:sldId id="277" r:id="rId21"/>
+    <p:sldId id="273" r:id="rId19"/>
+    <p:sldId id="284" r:id="rId20"/>
+    <p:sldId id="285" r:id="rId21"/>
     <p:sldId id="278" r:id="rId22"/>
     <p:sldId id="280" r:id="rId23"/>
   </p:sldIdLst>
@@ -280,7 +280,7 @@
           <a:p>
             <a:fld id="{877A101C-329B-4D6D-B565-699C6EAC95AD}" type="datetimeFigureOut">
               <a:rPr lang="ko-KR" altLang="en-US" smtClean="0"/>
-              <a:t>2019-11-24</a:t>
+              <a:t>2019-11-25</a:t>
             </a:fld>
             <a:endParaRPr lang="ko-KR" altLang="en-US"/>
           </a:p>
@@ -478,7 +478,7 @@
           <a:p>
             <a:fld id="{877A101C-329B-4D6D-B565-699C6EAC95AD}" type="datetimeFigureOut">
               <a:rPr lang="ko-KR" altLang="en-US" smtClean="0"/>
-              <a:t>2019-11-24</a:t>
+              <a:t>2019-11-25</a:t>
             </a:fld>
             <a:endParaRPr lang="ko-KR" altLang="en-US"/>
           </a:p>
@@ -686,7 +686,7 @@
           <a:p>
             <a:fld id="{877A101C-329B-4D6D-B565-699C6EAC95AD}" type="datetimeFigureOut">
               <a:rPr lang="ko-KR" altLang="en-US" smtClean="0"/>
-              <a:t>2019-11-24</a:t>
+              <a:t>2019-11-25</a:t>
             </a:fld>
             <a:endParaRPr lang="ko-KR" altLang="en-US"/>
           </a:p>
@@ -884,7 +884,7 @@
           <a:p>
             <a:fld id="{877A101C-329B-4D6D-B565-699C6EAC95AD}" type="datetimeFigureOut">
               <a:rPr lang="ko-KR" altLang="en-US" smtClean="0"/>
-              <a:t>2019-11-24</a:t>
+              <a:t>2019-11-25</a:t>
             </a:fld>
             <a:endParaRPr lang="ko-KR" altLang="en-US"/>
           </a:p>
@@ -1159,7 +1159,7 @@
           <a:p>
             <a:fld id="{877A101C-329B-4D6D-B565-699C6EAC95AD}" type="datetimeFigureOut">
               <a:rPr lang="ko-KR" altLang="en-US" smtClean="0"/>
-              <a:t>2019-11-24</a:t>
+              <a:t>2019-11-25</a:t>
             </a:fld>
             <a:endParaRPr lang="ko-KR" altLang="en-US"/>
           </a:p>
@@ -1424,7 +1424,7 @@
           <a:p>
             <a:fld id="{877A101C-329B-4D6D-B565-699C6EAC95AD}" type="datetimeFigureOut">
               <a:rPr lang="ko-KR" altLang="en-US" smtClean="0"/>
-              <a:t>2019-11-24</a:t>
+              <a:t>2019-11-25</a:t>
             </a:fld>
             <a:endParaRPr lang="ko-KR" altLang="en-US"/>
           </a:p>
@@ -1836,7 +1836,7 @@
           <a:p>
             <a:fld id="{877A101C-329B-4D6D-B565-699C6EAC95AD}" type="datetimeFigureOut">
               <a:rPr lang="ko-KR" altLang="en-US" smtClean="0"/>
-              <a:t>2019-11-24</a:t>
+              <a:t>2019-11-25</a:t>
             </a:fld>
             <a:endParaRPr lang="ko-KR" altLang="en-US"/>
           </a:p>
@@ -1977,7 +1977,7 @@
           <a:p>
             <a:fld id="{877A101C-329B-4D6D-B565-699C6EAC95AD}" type="datetimeFigureOut">
               <a:rPr lang="ko-KR" altLang="en-US" smtClean="0"/>
-              <a:t>2019-11-24</a:t>
+              <a:t>2019-11-25</a:t>
             </a:fld>
             <a:endParaRPr lang="ko-KR" altLang="en-US"/>
           </a:p>
@@ -2090,7 +2090,7 @@
           <a:p>
             <a:fld id="{877A101C-329B-4D6D-B565-699C6EAC95AD}" type="datetimeFigureOut">
               <a:rPr lang="ko-KR" altLang="en-US" smtClean="0"/>
-              <a:t>2019-11-24</a:t>
+              <a:t>2019-11-25</a:t>
             </a:fld>
             <a:endParaRPr lang="ko-KR" altLang="en-US"/>
           </a:p>
@@ -2401,7 +2401,7 @@
           <a:p>
             <a:fld id="{877A101C-329B-4D6D-B565-699C6EAC95AD}" type="datetimeFigureOut">
               <a:rPr lang="ko-KR" altLang="en-US" smtClean="0"/>
-              <a:t>2019-11-24</a:t>
+              <a:t>2019-11-25</a:t>
             </a:fld>
             <a:endParaRPr lang="ko-KR" altLang="en-US"/>
           </a:p>
@@ -2689,7 +2689,7 @@
           <a:p>
             <a:fld id="{877A101C-329B-4D6D-B565-699C6EAC95AD}" type="datetimeFigureOut">
               <a:rPr lang="ko-KR" altLang="en-US" smtClean="0"/>
-              <a:t>2019-11-24</a:t>
+              <a:t>2019-11-25</a:t>
             </a:fld>
             <a:endParaRPr lang="ko-KR" altLang="en-US"/>
           </a:p>
@@ -2930,7 +2930,7 @@
           <a:p>
             <a:fld id="{877A101C-329B-4D6D-B565-699C6EAC95AD}" type="datetimeFigureOut">
               <a:rPr lang="ko-KR" altLang="en-US" smtClean="0"/>
-              <a:t>2019-11-24</a:t>
+              <a:t>2019-11-25</a:t>
             </a:fld>
             <a:endParaRPr lang="ko-KR" altLang="en-US"/>
           </a:p>
@@ -3593,13 +3593,13 @@
   <p:clrMapOvr>
     <a:masterClrMapping/>
   </p:clrMapOvr>
-  <mc:AlternateContent xmlns:mc="http://schemas.openxmlformats.org/markup-compatibility/2006">
-    <mc:Choice xmlns:p159="http://schemas.microsoft.com/office/powerpoint/2015/09/main" Requires="p159">
+  <mc:AlternateContent xmlns:mc="http://schemas.openxmlformats.org/markup-compatibility/2006" xmlns:p159="http://schemas.microsoft.com/office/powerpoint/2015/09/main">
+    <mc:Choice Requires="p159">
       <p:transition xmlns:p14="http://schemas.microsoft.com/office/powerpoint/2010/main" spd="slow" p14:dur="2000">
         <p159:morph option="byObject"/>
       </p:transition>
     </mc:Choice>
-    <mc:Fallback>
+    <mc:Fallback xmlns="">
       <p:transition spd="slow">
         <p:fade/>
       </p:transition>
@@ -4371,13 +4371,13 @@
   <p:clrMapOvr>
     <a:masterClrMapping/>
   </p:clrMapOvr>
-  <mc:AlternateContent xmlns:mc="http://schemas.openxmlformats.org/markup-compatibility/2006">
-    <mc:Choice xmlns:p159="http://schemas.microsoft.com/office/powerpoint/2015/09/main" Requires="p159">
+  <mc:AlternateContent xmlns:mc="http://schemas.openxmlformats.org/markup-compatibility/2006" xmlns:p159="http://schemas.microsoft.com/office/powerpoint/2015/09/main">
+    <mc:Choice Requires="p159">
       <p:transition xmlns:p14="http://schemas.microsoft.com/office/powerpoint/2010/main" spd="slow" p14:dur="2000">
         <p159:morph option="byObject"/>
       </p:transition>
     </mc:Choice>
-    <mc:Fallback>
+    <mc:Fallback xmlns="">
       <p:transition spd="slow">
         <p:fade/>
       </p:transition>
@@ -5220,13 +5220,13 @@
   <p:clrMapOvr>
     <a:masterClrMapping/>
   </p:clrMapOvr>
-  <mc:AlternateContent xmlns:mc="http://schemas.openxmlformats.org/markup-compatibility/2006">
-    <mc:Choice xmlns:p159="http://schemas.microsoft.com/office/powerpoint/2015/09/main" Requires="p159">
+  <mc:AlternateContent xmlns:mc="http://schemas.openxmlformats.org/markup-compatibility/2006" xmlns:p159="http://schemas.microsoft.com/office/powerpoint/2015/09/main">
+    <mc:Choice Requires="p159">
       <p:transition xmlns:p14="http://schemas.microsoft.com/office/powerpoint/2010/main" spd="slow" p14:dur="2000">
         <p159:morph option="byObject"/>
       </p:transition>
     </mc:Choice>
-    <mc:Fallback>
+    <mc:Fallback xmlns="">
       <p:transition spd="slow">
         <p:fade/>
       </p:transition>
@@ -6000,13 +6000,13 @@
   <p:clrMapOvr>
     <a:masterClrMapping/>
   </p:clrMapOvr>
-  <mc:AlternateContent xmlns:mc="http://schemas.openxmlformats.org/markup-compatibility/2006">
-    <mc:Choice xmlns:p159="http://schemas.microsoft.com/office/powerpoint/2015/09/main" Requires="p159">
+  <mc:AlternateContent xmlns:mc="http://schemas.openxmlformats.org/markup-compatibility/2006" xmlns:p159="http://schemas.microsoft.com/office/powerpoint/2015/09/main">
+    <mc:Choice Requires="p159">
       <p:transition xmlns:p14="http://schemas.microsoft.com/office/powerpoint/2010/main" spd="slow" p14:dur="2000">
         <p159:morph option="byObject"/>
       </p:transition>
     </mc:Choice>
-    <mc:Fallback>
+    <mc:Fallback xmlns="">
       <p:transition spd="slow">
         <p:fade/>
       </p:transition>
@@ -6680,13 +6680,13 @@
   <p:clrMapOvr>
     <a:masterClrMapping/>
   </p:clrMapOvr>
-  <mc:AlternateContent xmlns:mc="http://schemas.openxmlformats.org/markup-compatibility/2006">
-    <mc:Choice xmlns:p159="http://schemas.microsoft.com/office/powerpoint/2015/09/main" Requires="p159">
+  <mc:AlternateContent xmlns:mc="http://schemas.openxmlformats.org/markup-compatibility/2006" xmlns:p159="http://schemas.microsoft.com/office/powerpoint/2015/09/main">
+    <mc:Choice Requires="p159">
       <p:transition xmlns:p14="http://schemas.microsoft.com/office/powerpoint/2010/main" spd="slow" p14:dur="2000">
         <p159:morph option="byObject"/>
       </p:transition>
     </mc:Choice>
-    <mc:Fallback>
+    <mc:Fallback xmlns="">
       <p:transition spd="slow">
         <p:fade/>
       </p:transition>
@@ -6986,13 +6986,13 @@
   <p:clrMapOvr>
     <a:masterClrMapping/>
   </p:clrMapOvr>
-  <mc:AlternateContent xmlns:mc="http://schemas.openxmlformats.org/markup-compatibility/2006">
-    <mc:Choice xmlns:p159="http://schemas.microsoft.com/office/powerpoint/2015/09/main" Requires="p159">
+  <mc:AlternateContent xmlns:mc="http://schemas.openxmlformats.org/markup-compatibility/2006" xmlns:p159="http://schemas.microsoft.com/office/powerpoint/2015/09/main">
+    <mc:Choice Requires="p159">
       <p:transition xmlns:p14="http://schemas.microsoft.com/office/powerpoint/2010/main" spd="slow" p14:dur="2000">
         <p159:morph option="byObject"/>
       </p:transition>
     </mc:Choice>
-    <mc:Fallback>
+    <mc:Fallback xmlns="">
       <p:transition spd="slow">
         <p:fade/>
       </p:transition>
@@ -7307,13 +7307,13 @@
   <p:clrMapOvr>
     <a:masterClrMapping/>
   </p:clrMapOvr>
-  <mc:AlternateContent xmlns:mc="http://schemas.openxmlformats.org/markup-compatibility/2006">
-    <mc:Choice xmlns:p159="http://schemas.microsoft.com/office/powerpoint/2015/09/main" Requires="p159">
+  <mc:AlternateContent xmlns:mc="http://schemas.openxmlformats.org/markup-compatibility/2006" xmlns:p159="http://schemas.microsoft.com/office/powerpoint/2015/09/main">
+    <mc:Choice Requires="p159">
       <p:transition xmlns:p14="http://schemas.microsoft.com/office/powerpoint/2010/main" spd="slow" p14:dur="2000">
         <p159:morph option="byObject"/>
       </p:transition>
     </mc:Choice>
-    <mc:Fallback>
+    <mc:Fallback xmlns="">
       <p:transition spd="slow">
         <p:fade/>
       </p:transition>
@@ -7628,13 +7628,13 @@
   <p:clrMapOvr>
     <a:masterClrMapping/>
   </p:clrMapOvr>
-  <mc:AlternateContent xmlns:mc="http://schemas.openxmlformats.org/markup-compatibility/2006">
-    <mc:Choice xmlns:p159="http://schemas.microsoft.com/office/powerpoint/2015/09/main" Requires="p159">
+  <mc:AlternateContent xmlns:mc="http://schemas.openxmlformats.org/markup-compatibility/2006" xmlns:p159="http://schemas.microsoft.com/office/powerpoint/2015/09/main">
+    <mc:Choice Requires="p159">
       <p:transition xmlns:p14="http://schemas.microsoft.com/office/powerpoint/2010/main" spd="slow" p14:dur="2000">
         <p159:morph option="byObject"/>
       </p:transition>
     </mc:Choice>
-    <mc:Fallback>
+    <mc:Fallback xmlns="">
       <p:transition spd="slow">
         <p:fade/>
       </p:transition>
@@ -7889,13 +7889,13 @@
   <p:clrMapOvr>
     <a:masterClrMapping/>
   </p:clrMapOvr>
-  <mc:AlternateContent xmlns:mc="http://schemas.openxmlformats.org/markup-compatibility/2006">
-    <mc:Choice xmlns:p159="http://schemas.microsoft.com/office/powerpoint/2015/09/main" Requires="p159">
+  <mc:AlternateContent xmlns:mc="http://schemas.openxmlformats.org/markup-compatibility/2006" xmlns:p159="http://schemas.microsoft.com/office/powerpoint/2015/09/main">
+    <mc:Choice Requires="p159">
       <p:transition xmlns:p14="http://schemas.microsoft.com/office/powerpoint/2010/main" spd="slow" p14:dur="2000">
         <p159:morph option="byObject"/>
       </p:transition>
     </mc:Choice>
-    <mc:Fallback>
+    <mc:Fallback xmlns="">
       <p:transition spd="slow">
         <p:fade/>
       </p:transition>
@@ -8060,7 +8060,7 @@
         </p:blipFill>
         <p:spPr>
           <a:xfrm>
-            <a:off x="4646929" y="2052232"/>
+            <a:off x="1382868" y="2052232"/>
             <a:ext cx="2892407" cy="1506065"/>
           </a:xfrm>
           <a:prstGeom prst="rect">
@@ -8104,59 +8104,23 @@
           </a:prstGeom>
         </p:spPr>
       </p:pic>
-      <p:pic>
-        <p:nvPicPr>
-          <p:cNvPr id="3" name="그림 2">
-            <a:extLst>
-              <a:ext uri="{FF2B5EF4-FFF2-40B4-BE49-F238E27FC236}">
-                <a16:creationId xmlns:a16="http://schemas.microsoft.com/office/drawing/2014/main" id="{AF8441A0-0F52-4BB6-87D2-A7E13FBA71E2}"/>
-              </a:ext>
-            </a:extLst>
-          </p:cNvPr>
-          <p:cNvPicPr>
-            <a:picLocks noChangeAspect="1"/>
-          </p:cNvPicPr>
-          <p:nvPr/>
-        </p:nvPicPr>
-        <p:blipFill>
-          <a:blip r:embed="rId4">
-            <a:extLst>
-              <a:ext uri="{28A0092B-C50C-407E-A947-70E740481C1C}">
-                <a14:useLocalDpi xmlns:a14="http://schemas.microsoft.com/office/drawing/2010/main" val="0"/>
-              </a:ext>
-            </a:extLst>
-          </a:blip>
-          <a:stretch>
-            <a:fillRect/>
-          </a:stretch>
-        </p:blipFill>
-        <p:spPr>
-          <a:xfrm>
-            <a:off x="1507977" y="2052232"/>
-            <a:ext cx="1975412" cy="1975412"/>
-          </a:xfrm>
-          <a:prstGeom prst="rect">
-            <a:avLst/>
-          </a:prstGeom>
-        </p:spPr>
-      </p:pic>
     </p:spTree>
     <p:extLst>
       <p:ext uri="{BB962C8B-B14F-4D97-AF65-F5344CB8AC3E}">
-        <p14:creationId xmlns:p14="http://schemas.microsoft.com/office/powerpoint/2010/main" val="579393120"/>
+        <p14:creationId xmlns:p14="http://schemas.microsoft.com/office/powerpoint/2010/main" val="3371719678"/>
       </p:ext>
     </p:extLst>
   </p:cSld>
   <p:clrMapOvr>
     <a:masterClrMapping/>
   </p:clrMapOvr>
-  <mc:AlternateContent xmlns:mc="http://schemas.openxmlformats.org/markup-compatibility/2006">
-    <mc:Choice xmlns:p159="http://schemas.microsoft.com/office/powerpoint/2015/09/main" Requires="p159">
+  <mc:AlternateContent xmlns:mc="http://schemas.openxmlformats.org/markup-compatibility/2006" xmlns:p159="http://schemas.microsoft.com/office/powerpoint/2015/09/main">
+    <mc:Choice Requires="p159">
       <p:transition xmlns:p14="http://schemas.microsoft.com/office/powerpoint/2010/main" spd="slow" p14:dur="2000">
         <p159:morph option="byObject"/>
       </p:transition>
     </mc:Choice>
-    <mc:Fallback>
+    <mc:Fallback xmlns="">
       <p:transition spd="slow">
         <p:fade/>
       </p:transition>
@@ -8473,108 +8437,25 @@
     </p:spTree>
     <p:extLst>
       <p:ext uri="{BB962C8B-B14F-4D97-AF65-F5344CB8AC3E}">
-        <p14:creationId xmlns:p14="http://schemas.microsoft.com/office/powerpoint/2010/main" val="3371719678"/>
+        <p14:creationId xmlns:p14="http://schemas.microsoft.com/office/powerpoint/2010/main" val="1424742172"/>
       </p:ext>
     </p:extLst>
   </p:cSld>
   <p:clrMapOvr>
     <a:masterClrMapping/>
   </p:clrMapOvr>
-  <mc:AlternateContent xmlns:mc="http://schemas.openxmlformats.org/markup-compatibility/2006">
-    <mc:Choice xmlns:p159="http://schemas.microsoft.com/office/powerpoint/2015/09/main" Requires="p159">
+  <mc:AlternateContent xmlns:mc="http://schemas.openxmlformats.org/markup-compatibility/2006" xmlns:p159="http://schemas.microsoft.com/office/powerpoint/2015/09/main">
+    <mc:Choice Requires="p159">
       <p:transition xmlns:p14="http://schemas.microsoft.com/office/powerpoint/2010/main" spd="slow" p14:dur="2000">
         <p159:morph option="byObject"/>
       </p:transition>
     </mc:Choice>
-    <mc:Fallback>
+    <mc:Fallback xmlns="">
       <p:transition spd="slow">
         <p:fade/>
       </p:transition>
     </mc:Fallback>
   </mc:AlternateContent>
-  <p:timing>
-    <p:tnLst>
-      <p:par>
-        <p:cTn id="1" dur="indefinite" restart="never" nodeType="tmRoot">
-          <p:childTnLst>
-            <p:seq concurrent="1" nextAc="seek">
-              <p:cTn id="2" dur="indefinite" nodeType="mainSeq">
-                <p:childTnLst>
-                  <p:par>
-                    <p:cTn id="3" fill="hold">
-                      <p:stCondLst>
-                        <p:cond delay="indefinite"/>
-                      </p:stCondLst>
-                      <p:childTnLst>
-                        <p:par>
-                          <p:cTn id="4" fill="hold">
-                            <p:stCondLst>
-                              <p:cond delay="0"/>
-                            </p:stCondLst>
-                            <p:childTnLst>
-                              <p:par>
-                                <p:cTn id="5" presetID="22" presetClass="entr" presetSubtype="8" fill="hold" nodeType="clickEffect">
-                                  <p:stCondLst>
-                                    <p:cond delay="0"/>
-                                  </p:stCondLst>
-                                  <p:childTnLst>
-                                    <p:set>
-                                      <p:cBhvr>
-                                        <p:cTn id="6" dur="1" fill="hold">
-                                          <p:stCondLst>
-                                            <p:cond delay="0"/>
-                                          </p:stCondLst>
-                                        </p:cTn>
-                                        <p:tgtEl>
-                                          <p:spTgt spid="30"/>
-                                        </p:tgtEl>
-                                        <p:attrNameLst>
-                                          <p:attrName>style.visibility</p:attrName>
-                                        </p:attrNameLst>
-                                      </p:cBhvr>
-                                      <p:to>
-                                        <p:strVal val="visible"/>
-                                      </p:to>
-                                    </p:set>
-                                    <p:animEffect transition="in" filter="wipe(left)">
-                                      <p:cBhvr>
-                                        <p:cTn id="7" dur="500"/>
-                                        <p:tgtEl>
-                                          <p:spTgt spid="30"/>
-                                        </p:tgtEl>
-                                      </p:cBhvr>
-                                    </p:animEffect>
-                                  </p:childTnLst>
-                                </p:cTn>
-                              </p:par>
-                            </p:childTnLst>
-                          </p:cTn>
-                        </p:par>
-                      </p:childTnLst>
-                    </p:cTn>
-                  </p:par>
-                </p:childTnLst>
-              </p:cTn>
-              <p:prevCondLst>
-                <p:cond evt="onPrev" delay="0">
-                  <p:tgtEl>
-                    <p:sldTgt/>
-                  </p:tgtEl>
-                </p:cond>
-              </p:prevCondLst>
-              <p:nextCondLst>
-                <p:cond evt="onNext" delay="0">
-                  <p:tgtEl>
-                    <p:sldTgt/>
-                  </p:tgtEl>
-                </p:cond>
-              </p:nextCondLst>
-            </p:seq>
-          </p:childTnLst>
-        </p:cTn>
-      </p:par>
-    </p:tnLst>
-  </p:timing>
 </p:sld>
 </file>
 
@@ -9078,13 +8959,13 @@
   <p:clrMapOvr>
     <a:masterClrMapping/>
   </p:clrMapOvr>
-  <mc:AlternateContent xmlns:mc="http://schemas.openxmlformats.org/markup-compatibility/2006">
-    <mc:Choice xmlns:p159="http://schemas.microsoft.com/office/powerpoint/2015/09/main" Requires="p159">
+  <mc:AlternateContent xmlns:mc="http://schemas.openxmlformats.org/markup-compatibility/2006" xmlns:p159="http://schemas.microsoft.com/office/powerpoint/2015/09/main">
+    <mc:Choice Requires="p159">
       <p:transition xmlns:p14="http://schemas.microsoft.com/office/powerpoint/2010/main" spd="slow" p14:dur="2000">
         <p159:morph option="byObject"/>
       </p:transition>
     </mc:Choice>
-    <mc:Fallback>
+    <mc:Fallback xmlns="">
       <p:transition spd="slow">
         <p:fade/>
       </p:transition>
@@ -9193,54 +9074,6 @@
           <a:chExt cx="0" cy="0"/>
         </a:xfrm>
       </p:grpSpPr>
-      <p:cxnSp>
-        <p:nvCxnSpPr>
-          <p:cNvPr id="19" name="연결선: 구부러짐 18">
-            <a:extLst>
-              <a:ext uri="{FF2B5EF4-FFF2-40B4-BE49-F238E27FC236}">
-                <a16:creationId xmlns:a16="http://schemas.microsoft.com/office/drawing/2014/main" id="{309E180D-72F1-464E-81F7-468CCFD4381E}"/>
-              </a:ext>
-            </a:extLst>
-          </p:cNvPr>
-          <p:cNvCxnSpPr>
-            <a:cxnSpLocks/>
-            <a:stCxn id="7" idx="0"/>
-            <a:endCxn id="8" idx="0"/>
-          </p:cNvCxnSpPr>
-          <p:nvPr/>
-        </p:nvCxnSpPr>
-        <p:spPr>
-          <a:xfrm rot="16200000" flipH="1">
-            <a:off x="6380031" y="-1498727"/>
-            <a:ext cx="129298" cy="7231216"/>
-          </a:xfrm>
-          <a:prstGeom prst="curvedConnector3">
-            <a:avLst>
-              <a:gd name="adj1" fmla="val -577550"/>
-            </a:avLst>
-          </a:prstGeom>
-          <a:ln w="57150">
-            <a:solidFill>
-              <a:srgbClr val="3ED7C4"/>
-            </a:solidFill>
-            <a:tailEnd type="triangle"/>
-          </a:ln>
-        </p:spPr>
-        <p:style>
-          <a:lnRef idx="1">
-            <a:schemeClr val="accent1"/>
-          </a:lnRef>
-          <a:fillRef idx="0">
-            <a:schemeClr val="accent1"/>
-          </a:fillRef>
-          <a:effectRef idx="0">
-            <a:schemeClr val="accent1"/>
-          </a:effectRef>
-          <a:fontRef idx="minor">
-            <a:schemeClr val="tx1"/>
-          </a:fontRef>
-        </p:style>
-      </p:cxnSp>
       <p:sp>
         <p:nvSpPr>
           <p:cNvPr id="4" name="직사각형 3">
@@ -9424,48 +9257,12 @@
           </a:prstGeom>
         </p:spPr>
       </p:pic>
-      <p:pic>
-        <p:nvPicPr>
-          <p:cNvPr id="3" name="그림 2">
-            <a:extLst>
-              <a:ext uri="{FF2B5EF4-FFF2-40B4-BE49-F238E27FC236}">
-                <a16:creationId xmlns:a16="http://schemas.microsoft.com/office/drawing/2014/main" id="{CBFF29AA-4EF5-4A09-8AB9-8391A028627E}"/>
-              </a:ext>
-            </a:extLst>
-          </p:cNvPr>
-          <p:cNvPicPr>
-            <a:picLocks noChangeAspect="1"/>
-          </p:cNvPicPr>
-          <p:nvPr/>
-        </p:nvPicPr>
-        <p:blipFill>
-          <a:blip r:embed="rId4">
-            <a:extLst>
-              <a:ext uri="{28A0092B-C50C-407E-A947-70E740481C1C}">
-                <a14:useLocalDpi xmlns:a14="http://schemas.microsoft.com/office/drawing/2010/main" val="0"/>
-              </a:ext>
-            </a:extLst>
-          </a:blip>
-          <a:stretch>
-            <a:fillRect/>
-          </a:stretch>
-        </p:blipFill>
-        <p:spPr>
-          <a:xfrm>
-            <a:off x="6151135" y="835895"/>
-            <a:ext cx="861758" cy="861758"/>
-          </a:xfrm>
-          <a:prstGeom prst="rect">
-            <a:avLst/>
-          </a:prstGeom>
-        </p:spPr>
-      </p:pic>
       <p:grpSp>
         <p:nvGrpSpPr>
-          <p:cNvPr id="10" name="그룹 9">
-            <a:extLst>
-              <a:ext uri="{FF2B5EF4-FFF2-40B4-BE49-F238E27FC236}">
-                <a16:creationId xmlns:a16="http://schemas.microsoft.com/office/drawing/2014/main" id="{796A3521-5C04-466A-8769-965A41700448}"/>
+          <p:cNvPr id="30" name="그룹 29">
+            <a:extLst>
+              <a:ext uri="{FF2B5EF4-FFF2-40B4-BE49-F238E27FC236}">
+                <a16:creationId xmlns:a16="http://schemas.microsoft.com/office/drawing/2014/main" id="{E7F68678-EEE3-40D1-8815-08C927EABD8D}"/>
               </a:ext>
             </a:extLst>
           </p:cNvPr>
@@ -9474,25 +9271,128 @@
         </p:nvGrpSpPr>
         <p:grpSpPr>
           <a:xfrm>
-            <a:off x="2829072" y="2533071"/>
-            <a:ext cx="7231216" cy="2595252"/>
-            <a:chOff x="2829072" y="2533071"/>
-            <a:chExt cx="7231216" cy="2595252"/>
+            <a:off x="2829072" y="835895"/>
+            <a:ext cx="7231216" cy="1345635"/>
+            <a:chOff x="2829072" y="835895"/>
+            <a:chExt cx="7231216" cy="1345635"/>
           </a:xfrm>
         </p:grpSpPr>
         <p:cxnSp>
           <p:nvCxnSpPr>
-            <p:cNvPr id="15" name="직선 연결선 14">
+            <p:cNvPr id="19" name="연결선: 구부러짐 18">
               <a:extLst>
                 <a:ext uri="{FF2B5EF4-FFF2-40B4-BE49-F238E27FC236}">
-                  <a16:creationId xmlns:a16="http://schemas.microsoft.com/office/drawing/2014/main" id="{C50EAF9E-1F08-47B9-9CC6-2595F7C7E3EA}"/>
+                  <a16:creationId xmlns:a16="http://schemas.microsoft.com/office/drawing/2014/main" id="{309E180D-72F1-464E-81F7-468CCFD4381E}"/>
                 </a:ext>
               </a:extLst>
             </p:cNvPr>
             <p:cNvCxnSpPr>
               <a:cxnSpLocks/>
-              <a:stCxn id="7" idx="3"/>
-              <a:endCxn id="8" idx="1"/>
+              <a:stCxn id="7" idx="0"/>
+              <a:endCxn id="8" idx="0"/>
+            </p:cNvCxnSpPr>
+            <p:nvPr/>
+          </p:nvCxnSpPr>
+          <p:spPr>
+            <a:xfrm rot="16200000" flipH="1">
+              <a:off x="6380031" y="-1498727"/>
+              <a:ext cx="129298" cy="7231216"/>
+            </a:xfrm>
+            <a:prstGeom prst="curvedConnector3">
+              <a:avLst>
+                <a:gd name="adj1" fmla="val -577550"/>
+              </a:avLst>
+            </a:prstGeom>
+            <a:ln w="57150">
+              <a:solidFill>
+                <a:srgbClr val="3ED7C4"/>
+              </a:solidFill>
+              <a:tailEnd type="triangle"/>
+            </a:ln>
+          </p:spPr>
+          <p:style>
+            <a:lnRef idx="1">
+              <a:schemeClr val="accent1"/>
+            </a:lnRef>
+            <a:fillRef idx="0">
+              <a:schemeClr val="accent1"/>
+            </a:fillRef>
+            <a:effectRef idx="0">
+              <a:schemeClr val="accent1"/>
+            </a:effectRef>
+            <a:fontRef idx="minor">
+              <a:schemeClr val="tx1"/>
+            </a:fontRef>
+          </p:style>
+        </p:cxnSp>
+        <p:pic>
+          <p:nvPicPr>
+            <p:cNvPr id="3" name="그림 2">
+              <a:extLst>
+                <a:ext uri="{FF2B5EF4-FFF2-40B4-BE49-F238E27FC236}">
+                  <a16:creationId xmlns:a16="http://schemas.microsoft.com/office/drawing/2014/main" id="{CBFF29AA-4EF5-4A09-8AB9-8391A028627E}"/>
+                </a:ext>
+              </a:extLst>
+            </p:cNvPr>
+            <p:cNvPicPr>
+              <a:picLocks noChangeAspect="1"/>
+            </p:cNvPicPr>
+            <p:nvPr/>
+          </p:nvPicPr>
+          <p:blipFill>
+            <a:blip r:embed="rId4">
+              <a:extLst>
+                <a:ext uri="{28A0092B-C50C-407E-A947-70E740481C1C}">
+                  <a14:useLocalDpi xmlns:a14="http://schemas.microsoft.com/office/drawing/2010/main" val="0"/>
+                </a:ext>
+              </a:extLst>
+            </a:blip>
+            <a:stretch>
+              <a:fillRect/>
+            </a:stretch>
+          </p:blipFill>
+          <p:spPr>
+            <a:xfrm>
+              <a:off x="6151135" y="835895"/>
+              <a:ext cx="861758" cy="861758"/>
+            </a:xfrm>
+            <a:prstGeom prst="rect">
+              <a:avLst/>
+            </a:prstGeom>
+          </p:spPr>
+        </p:pic>
+      </p:grpSp>
+      <p:grpSp>
+        <p:nvGrpSpPr>
+          <p:cNvPr id="9" name="그룹 8">
+            <a:extLst>
+              <a:ext uri="{FF2B5EF4-FFF2-40B4-BE49-F238E27FC236}">
+                <a16:creationId xmlns:a16="http://schemas.microsoft.com/office/drawing/2014/main" id="{D2F318D6-6C27-48FA-80DF-0AA2CAC80AE7}"/>
+              </a:ext>
+            </a:extLst>
+          </p:cNvPr>
+          <p:cNvGrpSpPr/>
+          <p:nvPr/>
+        </p:nvGrpSpPr>
+        <p:grpSpPr>
+          <a:xfrm>
+            <a:off x="2829072" y="2533071"/>
+            <a:ext cx="7231216" cy="2595252"/>
+            <a:chOff x="2829072" y="2533071"/>
+            <a:chExt cx="7231216" cy="2595252"/>
+          </a:xfrm>
+        </p:grpSpPr>
+        <p:cxnSp>
+          <p:nvCxnSpPr>
+            <p:cNvPr id="10" name="직선 연결선 9">
+              <a:extLst>
+                <a:ext uri="{FF2B5EF4-FFF2-40B4-BE49-F238E27FC236}">
+                  <a16:creationId xmlns:a16="http://schemas.microsoft.com/office/drawing/2014/main" id="{A0959582-8D10-47B8-82F2-2E8AEBB02594}"/>
+                </a:ext>
+              </a:extLst>
+            </p:cNvPr>
+            <p:cNvCxnSpPr>
+              <a:cxnSpLocks/>
             </p:cNvCxnSpPr>
             <p:nvPr/>
           </p:nvCxnSpPr>
@@ -9529,17 +9429,15 @@
         </p:cxnSp>
         <p:cxnSp>
           <p:nvCxnSpPr>
-            <p:cNvPr id="24" name="연결선: 구부러짐 23">
+            <p:cNvPr id="11" name="연결선: 구부러짐 10">
               <a:extLst>
                 <a:ext uri="{FF2B5EF4-FFF2-40B4-BE49-F238E27FC236}">
-                  <a16:creationId xmlns:a16="http://schemas.microsoft.com/office/drawing/2014/main" id="{5CE2B456-A6E5-42A2-8A1D-2A77C9DC02C7}"/>
+                  <a16:creationId xmlns:a16="http://schemas.microsoft.com/office/drawing/2014/main" id="{59171980-F20F-46A5-A45C-350BB5EF8901}"/>
                 </a:ext>
               </a:extLst>
             </p:cNvPr>
             <p:cNvCxnSpPr>
               <a:cxnSpLocks/>
-              <a:stCxn id="7" idx="2"/>
-              <a:endCxn id="8" idx="2"/>
             </p:cNvCxnSpPr>
             <p:nvPr/>
           </p:nvCxnSpPr>
@@ -9577,10 +9475,10 @@
         </p:cxnSp>
         <p:grpSp>
           <p:nvGrpSpPr>
-            <p:cNvPr id="14" name="그룹 13">
+            <p:cNvPr id="12" name="그룹 11">
               <a:extLst>
                 <a:ext uri="{FF2B5EF4-FFF2-40B4-BE49-F238E27FC236}">
-                  <a16:creationId xmlns:a16="http://schemas.microsoft.com/office/drawing/2014/main" id="{CCF28578-5EF9-4E4E-9C16-A9821D6CD011}"/>
+                  <a16:creationId xmlns:a16="http://schemas.microsoft.com/office/drawing/2014/main" id="{19B27057-962B-4BBC-AE12-57C64E508AB1}"/>
                 </a:ext>
               </a:extLst>
             </p:cNvPr>
@@ -9597,10 +9495,10 @@
           </p:grpSpPr>
           <p:sp>
             <p:nvSpPr>
-              <p:cNvPr id="12" name="직사각형 11">
+              <p:cNvPr id="14" name="직사각형 13">
                 <a:extLst>
                   <a:ext uri="{FF2B5EF4-FFF2-40B4-BE49-F238E27FC236}">
-                    <a16:creationId xmlns:a16="http://schemas.microsoft.com/office/drawing/2014/main" id="{CC517A6F-BF57-4C4C-9841-423FC0425843}"/>
+                    <a16:creationId xmlns:a16="http://schemas.microsoft.com/office/drawing/2014/main" id="{09188AA8-B65B-48CF-A85B-4A6880A2E230}"/>
                   </a:ext>
                 </a:extLst>
               </p:cNvPr>
@@ -9716,10 +9614,10 @@
           </p:sp>
           <p:pic>
             <p:nvPicPr>
-              <p:cNvPr id="13" name="그림 12">
+              <p:cNvPr id="15" name="그림 14">
                 <a:extLst>
                   <a:ext uri="{FF2B5EF4-FFF2-40B4-BE49-F238E27FC236}">
-                    <a16:creationId xmlns:a16="http://schemas.microsoft.com/office/drawing/2014/main" id="{48FA0E50-EE57-46D3-8D16-9FE1E1036457}"/>
+                    <a16:creationId xmlns:a16="http://schemas.microsoft.com/office/drawing/2014/main" id="{AF3C443D-2511-44DB-A161-AC27776B3ADE}"/>
                   </a:ext>
                 </a:extLst>
               </p:cNvPr>
@@ -9753,10 +9651,10 @@
         </p:grpSp>
         <p:pic>
           <p:nvPicPr>
-            <p:cNvPr id="17" name="그림 16">
+            <p:cNvPr id="13" name="그림 12">
               <a:extLst>
                 <a:ext uri="{FF2B5EF4-FFF2-40B4-BE49-F238E27FC236}">
-                  <a16:creationId xmlns:a16="http://schemas.microsoft.com/office/drawing/2014/main" id="{C8C96C41-2498-4B89-945A-549B9713E62E}"/>
+                  <a16:creationId xmlns:a16="http://schemas.microsoft.com/office/drawing/2014/main" id="{1FAF65DC-79F4-4612-A259-DBEFD1D06690}"/>
                 </a:ext>
               </a:extLst>
             </p:cNvPr>
@@ -9790,20 +9688,20 @@
     </p:spTree>
     <p:extLst>
       <p:ext uri="{BB962C8B-B14F-4D97-AF65-F5344CB8AC3E}">
-        <p14:creationId xmlns:p14="http://schemas.microsoft.com/office/powerpoint/2010/main" val="4272228920"/>
+        <p14:creationId xmlns:p14="http://schemas.microsoft.com/office/powerpoint/2010/main" val="1164747347"/>
       </p:ext>
     </p:extLst>
   </p:cSld>
   <p:clrMapOvr>
     <a:masterClrMapping/>
   </p:clrMapOvr>
-  <mc:AlternateContent xmlns:mc="http://schemas.openxmlformats.org/markup-compatibility/2006">
-    <mc:Choice xmlns:p159="http://schemas.microsoft.com/office/powerpoint/2015/09/main" Requires="p159">
+  <mc:AlternateContent xmlns:mc="http://schemas.openxmlformats.org/markup-compatibility/2006" xmlns:p159="http://schemas.microsoft.com/office/powerpoint/2015/09/main">
+    <mc:Choice Requires="p159">
       <p:transition xmlns:p14="http://schemas.microsoft.com/office/powerpoint/2010/main" spd="slow" p14:dur="2000">
         <p159:morph option="byObject"/>
       </p:transition>
     </mc:Choice>
-    <mc:Fallback>
+    <mc:Fallback xmlns="">
       <p:transition spd="slow">
         <p:fade/>
       </p:transition>
@@ -9843,7 +9741,7 @@
                                           </p:stCondLst>
                                         </p:cTn>
                                         <p:tgtEl>
-                                          <p:spTgt spid="10"/>
+                                          <p:spTgt spid="9"/>
                                         </p:tgtEl>
                                         <p:attrNameLst>
                                           <p:attrName>style.visibility</p:attrName>
@@ -9857,7 +9755,7 @@
                                       <p:cBhvr>
                                         <p:cTn id="7" dur="500"/>
                                         <p:tgtEl>
-                                          <p:spTgt spid="10"/>
+                                          <p:spTgt spid="9"/>
                                         </p:tgtEl>
                                       </p:cBhvr>
                                     </p:animEffect>
@@ -10105,13 +10003,13 @@
   <p:clrMapOvr>
     <a:masterClrMapping/>
   </p:clrMapOvr>
-  <mc:AlternateContent xmlns:mc="http://schemas.openxmlformats.org/markup-compatibility/2006">
-    <mc:Choice xmlns:p159="http://schemas.microsoft.com/office/powerpoint/2015/09/main" Requires="p159">
+  <mc:AlternateContent xmlns:mc="http://schemas.openxmlformats.org/markup-compatibility/2006" xmlns:p159="http://schemas.microsoft.com/office/powerpoint/2015/09/main">
+    <mc:Choice Requires="p159">
       <p:transition xmlns:p14="http://schemas.microsoft.com/office/powerpoint/2010/main" spd="slow" p14:dur="2000">
         <p159:morph option="byObject"/>
       </p:transition>
     </mc:Choice>
-    <mc:Fallback>
+    <mc:Fallback xmlns="">
       <p:transition spd="slow">
         <p:fade/>
       </p:transition>
@@ -10383,13 +10281,13 @@
   <p:clrMapOvr>
     <a:masterClrMapping/>
   </p:clrMapOvr>
-  <mc:AlternateContent xmlns:mc="http://schemas.openxmlformats.org/markup-compatibility/2006">
-    <mc:Choice xmlns:p159="http://schemas.microsoft.com/office/powerpoint/2015/09/main" Requires="p159">
+  <mc:AlternateContent xmlns:mc="http://schemas.openxmlformats.org/markup-compatibility/2006" xmlns:p159="http://schemas.microsoft.com/office/powerpoint/2015/09/main">
+    <mc:Choice Requires="p159">
       <p:transition xmlns:p14="http://schemas.microsoft.com/office/powerpoint/2010/main" spd="slow" p14:dur="2000">
         <p159:morph option="byObject"/>
       </p:transition>
     </mc:Choice>
-    <mc:Fallback>
+    <mc:Fallback xmlns="">
       <p:transition spd="slow">
         <p:fade/>
       </p:transition>
@@ -10700,13 +10598,13 @@
   <p:clrMapOvr>
     <a:masterClrMapping/>
   </p:clrMapOvr>
-  <mc:AlternateContent xmlns:mc="http://schemas.openxmlformats.org/markup-compatibility/2006">
-    <mc:Choice xmlns:p159="http://schemas.microsoft.com/office/powerpoint/2015/09/main" Requires="p159">
+  <mc:AlternateContent xmlns:mc="http://schemas.openxmlformats.org/markup-compatibility/2006" xmlns:p159="http://schemas.microsoft.com/office/powerpoint/2015/09/main">
+    <mc:Choice Requires="p159">
       <p:transition xmlns:p14="http://schemas.microsoft.com/office/powerpoint/2010/main" spd="slow" p14:dur="2000">
         <p159:morph option="byObject"/>
       </p:transition>
     </mc:Choice>
-    <mc:Fallback>
+    <mc:Fallback xmlns="">
       <p:transition spd="slow">
         <p:fade/>
       </p:transition>
@@ -11144,13 +11042,13 @@
   <p:clrMapOvr>
     <a:masterClrMapping/>
   </p:clrMapOvr>
-  <mc:AlternateContent xmlns:mc="http://schemas.openxmlformats.org/markup-compatibility/2006">
-    <mc:Choice xmlns:p159="http://schemas.microsoft.com/office/powerpoint/2015/09/main" Requires="p159">
+  <mc:AlternateContent xmlns:mc="http://schemas.openxmlformats.org/markup-compatibility/2006" xmlns:p159="http://schemas.microsoft.com/office/powerpoint/2015/09/main">
+    <mc:Choice Requires="p159">
       <p:transition xmlns:p14="http://schemas.microsoft.com/office/powerpoint/2010/main" spd="slow" p14:dur="2000">
         <p159:morph option="byObject"/>
       </p:transition>
     </mc:Choice>
-    <mc:Fallback>
+    <mc:Fallback xmlns="">
       <p:transition spd="slow">
         <p:fade/>
       </p:transition>
@@ -11515,13 +11413,13 @@
   <p:clrMapOvr>
     <a:masterClrMapping/>
   </p:clrMapOvr>
-  <mc:AlternateContent xmlns:mc="http://schemas.openxmlformats.org/markup-compatibility/2006">
-    <mc:Choice xmlns:p159="http://schemas.microsoft.com/office/powerpoint/2015/09/main" Requires="p159">
+  <mc:AlternateContent xmlns:mc="http://schemas.openxmlformats.org/markup-compatibility/2006" xmlns:p159="http://schemas.microsoft.com/office/powerpoint/2015/09/main">
+    <mc:Choice Requires="p159">
       <p:transition xmlns:p14="http://schemas.microsoft.com/office/powerpoint/2010/main" spd="slow" p14:dur="2000">
         <p159:morph option="byObject"/>
       </p:transition>
     </mc:Choice>
-    <mc:Fallback>
+    <mc:Fallback xmlns="">
       <p:transition spd="slow">
         <p:fade/>
       </p:transition>
@@ -11892,13 +11790,13 @@
   <p:clrMapOvr>
     <a:masterClrMapping/>
   </p:clrMapOvr>
-  <mc:AlternateContent xmlns:mc="http://schemas.openxmlformats.org/markup-compatibility/2006">
-    <mc:Choice xmlns:p159="http://schemas.microsoft.com/office/powerpoint/2015/09/main" Requires="p159">
+  <mc:AlternateContent xmlns:mc="http://schemas.openxmlformats.org/markup-compatibility/2006" xmlns:p159="http://schemas.microsoft.com/office/powerpoint/2015/09/main">
+    <mc:Choice Requires="p159">
       <p:transition xmlns:p14="http://schemas.microsoft.com/office/powerpoint/2010/main" spd="slow" p14:dur="2000">
         <p159:morph option="byObject"/>
       </p:transition>
     </mc:Choice>
-    <mc:Fallback>
+    <mc:Fallback xmlns="">
       <p:transition spd="slow">
         <p:fade/>
       </p:transition>
@@ -12105,13 +12003,13 @@
   <p:clrMapOvr>
     <a:masterClrMapping/>
   </p:clrMapOvr>
-  <mc:AlternateContent xmlns:mc="http://schemas.openxmlformats.org/markup-compatibility/2006">
-    <mc:Choice xmlns:p159="http://schemas.microsoft.com/office/powerpoint/2015/09/main" Requires="p159">
+  <mc:AlternateContent xmlns:mc="http://schemas.openxmlformats.org/markup-compatibility/2006" xmlns:p159="http://schemas.microsoft.com/office/powerpoint/2015/09/main">
+    <mc:Choice Requires="p159">
       <p:transition xmlns:p14="http://schemas.microsoft.com/office/powerpoint/2010/main" spd="slow" p14:dur="2000">
         <p159:morph option="byObject"/>
       </p:transition>
     </mc:Choice>
-    <mc:Fallback>
+    <mc:Fallback xmlns="">
       <p:transition spd="slow">
         <p:fade/>
       </p:transition>
@@ -12354,13 +12252,13 @@
   <p:clrMapOvr>
     <a:masterClrMapping/>
   </p:clrMapOvr>
-  <mc:AlternateContent xmlns:mc="http://schemas.openxmlformats.org/markup-compatibility/2006">
-    <mc:Choice xmlns:p159="http://schemas.microsoft.com/office/powerpoint/2015/09/main" Requires="p159">
+  <mc:AlternateContent xmlns:mc="http://schemas.openxmlformats.org/markup-compatibility/2006" xmlns:p159="http://schemas.microsoft.com/office/powerpoint/2015/09/main">
+    <mc:Choice Requires="p159">
       <p:transition xmlns:p14="http://schemas.microsoft.com/office/powerpoint/2010/main" spd="slow" p14:dur="2000">
         <p159:morph option="byObject"/>
       </p:transition>
     </mc:Choice>
-    <mc:Fallback>
+    <mc:Fallback xmlns="">
       <p:transition spd="slow">
         <p:fade/>
       </p:transition>
@@ -12762,13 +12660,13 @@
   <p:clrMapOvr>
     <a:masterClrMapping/>
   </p:clrMapOvr>
-  <mc:AlternateContent xmlns:mc="http://schemas.openxmlformats.org/markup-compatibility/2006">
-    <mc:Choice xmlns:p159="http://schemas.microsoft.com/office/powerpoint/2015/09/main" Requires="p159">
+  <mc:AlternateContent xmlns:mc="http://schemas.openxmlformats.org/markup-compatibility/2006" xmlns:p159="http://schemas.microsoft.com/office/powerpoint/2015/09/main">
+    <mc:Choice Requires="p159">
       <p:transition xmlns:p14="http://schemas.microsoft.com/office/powerpoint/2010/main" spd="slow" p14:dur="2000">
         <p159:morph option="byObject"/>
       </p:transition>
     </mc:Choice>
-    <mc:Fallback>
+    <mc:Fallback xmlns="">
       <p:transition spd="slow">
         <p:fade/>
       </p:transition>

</xml_diff>